<commit_message>
Archive Spring 2022 class
</commit_message>
<xml_diff>
--- a/Reflections.pptx
+++ b/Reflections.pptx
@@ -5,10 +5,10 @@
     <p:sldMasterId id="2147483648" r:id="rId1"/>
   </p:sldMasterIdLst>
   <p:notesMasterIdLst>
-    <p:notesMasterId r:id="rId7"/>
+    <p:notesMasterId r:id="rId8"/>
   </p:notesMasterIdLst>
   <p:handoutMasterIdLst>
-    <p:handoutMasterId r:id="rId8"/>
+    <p:handoutMasterId r:id="rId9"/>
   </p:handoutMasterIdLst>
   <p:sldIdLst>
     <p:sldId id="256" r:id="rId2"/>
@@ -16,6 +16,7 @@
     <p:sldId id="539" r:id="rId4"/>
     <p:sldId id="540" r:id="rId5"/>
     <p:sldId id="541" r:id="rId6"/>
+    <p:sldId id="542" r:id="rId7"/>
   </p:sldIdLst>
   <p:sldSz cx="9144000" cy="6858000" type="screen4x3"/>
   <p:notesSz cx="6858000" cy="9144000"/>
@@ -8078,7 +8079,7 @@
           <a:p>
             <a:r>
               <a:rPr lang="en-US" dirty="0"/>
-              <a:t>Controllability analysis for SBML models</a:t>
+              <a:t>Controllability analysis for SBML models (via DC gain)</a:t>
             </a:r>
           </a:p>
           <a:p>
@@ -8288,6 +8289,164 @@
     <p:extLst>
       <p:ext uri="{BB962C8B-B14F-4D97-AF65-F5344CB8AC3E}">
         <p14:creationId xmlns:p14="http://schemas.microsoft.com/office/powerpoint/2010/main" val="2068637199"/>
+      </p:ext>
+    </p:extLst>
+  </p:cSld>
+  <p:clrMapOvr>
+    <a:masterClrMapping/>
+  </p:clrMapOvr>
+</p:sld>
+</file>
+
+<file path=ppt/slides/slide6.xml><?xml version="1.0" encoding="utf-8"?>
+<p:sld xmlns:a="http://schemas.openxmlformats.org/drawingml/2006/main" xmlns:r="http://schemas.openxmlformats.org/officeDocument/2006/relationships" xmlns:p="http://schemas.openxmlformats.org/presentationml/2006/main">
+  <p:cSld>
+    <p:spTree>
+      <p:nvGrpSpPr>
+        <p:cNvPr id="1" name=""/>
+        <p:cNvGrpSpPr/>
+        <p:nvPr/>
+      </p:nvGrpSpPr>
+      <p:grpSpPr>
+        <a:xfrm>
+          <a:off x="0" y="0"/>
+          <a:ext cx="0" cy="0"/>
+          <a:chOff x="0" y="0"/>
+          <a:chExt cx="0" cy="0"/>
+        </a:xfrm>
+      </p:grpSpPr>
+      <p:sp>
+        <p:nvSpPr>
+          <p:cNvPr id="2" name="Title 1">
+            <a:extLst>
+              <a:ext uri="{FF2B5EF4-FFF2-40B4-BE49-F238E27FC236}">
+                <a16:creationId xmlns:a16="http://schemas.microsoft.com/office/drawing/2014/main" id="{962C6A33-84C4-D6D1-89AF-59EBC9575DB0}"/>
+              </a:ext>
+            </a:extLst>
+          </p:cNvPr>
+          <p:cNvSpPr>
+            <a:spLocks noGrp="1"/>
+          </p:cNvSpPr>
+          <p:nvPr>
+            <p:ph type="title"/>
+          </p:nvPr>
+        </p:nvSpPr>
+        <p:spPr/>
+        <p:txBody>
+          <a:bodyPr/>
+          <a:lstStyle/>
+          <a:p>
+            <a:r>
+              <a:rPr lang="en-US" dirty="0" err="1">
+                <a:latin typeface="Courier New" panose="02070309020205020404" pitchFamily="49" charset="0"/>
+                <a:cs typeface="Courier New" panose="02070309020205020404" pitchFamily="49" charset="0"/>
+                <a:hlinkClick r:id="rId2"/>
+              </a:rPr>
+              <a:t>controlSBML</a:t>
+            </a:r>
+            <a:endParaRPr lang="en-US" dirty="0">
+              <a:latin typeface="Courier New" panose="02070309020205020404" pitchFamily="49" charset="0"/>
+              <a:cs typeface="Courier New" panose="02070309020205020404" pitchFamily="49" charset="0"/>
+            </a:endParaRPr>
+          </a:p>
+        </p:txBody>
+      </p:sp>
+      <p:sp>
+        <p:nvSpPr>
+          <p:cNvPr id="4" name="Content Placeholder 3">
+            <a:extLst>
+              <a:ext uri="{FF2B5EF4-FFF2-40B4-BE49-F238E27FC236}">
+                <a16:creationId xmlns:a16="http://schemas.microsoft.com/office/drawing/2014/main" id="{86F8844B-4ED6-04DD-BC41-83875F437DE3}"/>
+              </a:ext>
+            </a:extLst>
+          </p:cNvPr>
+          <p:cNvSpPr>
+            <a:spLocks noGrp="1"/>
+          </p:cNvSpPr>
+          <p:nvPr>
+            <p:ph idx="1"/>
+          </p:nvPr>
+        </p:nvSpPr>
+        <p:spPr/>
+        <p:txBody>
+          <a:bodyPr/>
+          <a:lstStyle/>
+          <a:p>
+            <a:r>
+              <a:rPr lang="en-US" dirty="0"/>
+              <a:t>Interface SBML models with </a:t>
+            </a:r>
+            <a:r>
+              <a:rPr lang="en-US" dirty="0" err="1"/>
+              <a:t>CalTech</a:t>
+            </a:r>
+            <a:r>
+              <a:rPr lang="en-US" dirty="0"/>
+              <a:t> controls package for control analysis, design, and simulation</a:t>
+            </a:r>
+          </a:p>
+          <a:p>
+            <a:r>
+              <a:rPr lang="en-US" dirty="0"/>
+              <a:t>Controllability analysis</a:t>
+            </a:r>
+          </a:p>
+          <a:p>
+            <a:r>
+              <a:rPr lang="en-US" dirty="0"/>
+              <a:t>Create standard closed loop architectures</a:t>
+            </a:r>
+          </a:p>
+          <a:p>
+            <a:r>
+              <a:rPr lang="en-US" dirty="0"/>
+              <a:t>Analysis of closed loop architectures for bias, noise, disturbance</a:t>
+            </a:r>
+          </a:p>
+          <a:p>
+            <a:endParaRPr lang="en-US" dirty="0"/>
+          </a:p>
+        </p:txBody>
+      </p:sp>
+      <p:sp>
+        <p:nvSpPr>
+          <p:cNvPr id="3" name="Slide Number Placeholder 2">
+            <a:extLst>
+              <a:ext uri="{FF2B5EF4-FFF2-40B4-BE49-F238E27FC236}">
+                <a16:creationId xmlns:a16="http://schemas.microsoft.com/office/drawing/2014/main" id="{B7DBD03B-B9CD-E724-04E1-26EA07EC766D}"/>
+              </a:ext>
+            </a:extLst>
+          </p:cNvPr>
+          <p:cNvSpPr>
+            <a:spLocks noGrp="1"/>
+          </p:cNvSpPr>
+          <p:nvPr>
+            <p:ph type="sldNum" sz="quarter" idx="11"/>
+          </p:nvPr>
+        </p:nvSpPr>
+        <p:spPr/>
+        <p:txBody>
+          <a:bodyPr/>
+          <a:lstStyle/>
+          <a:p>
+            <a:pPr>
+              <a:defRPr/>
+            </a:pPr>
+            <a:fld id="{2E4304A7-0FB2-4094-BC1E-DB17183AD0C1}" type="slidenum">
+              <a:rPr lang="en-US" altLang="x-none" smtClean="0"/>
+              <a:pPr>
+                <a:defRPr/>
+              </a:pPr>
+              <a:t>6</a:t>
+            </a:fld>
+            <a:endParaRPr lang="en-US" altLang="x-none"/>
+          </a:p>
+        </p:txBody>
+      </p:sp>
+    </p:spTree>
+    <p:extLst>
+      <p:ext uri="{BB962C8B-B14F-4D97-AF65-F5344CB8AC3E}">
+        <p14:creationId xmlns:p14="http://schemas.microsoft.com/office/powerpoint/2010/main" val="4092823796"/>
       </p:ext>
     </p:extLst>
   </p:cSld>

</xml_diff>